<commit_message>
namen toegevoegd aan affiche
</commit_message>
<xml_diff>
--- a/Documentatie/sjabloon affiche project experience - v2.pptx
+++ b/Documentatie/sjabloon affiche project experience - v2.pptx
@@ -115,16 +115,40 @@
 </p:presentation>
 </file>
 
-<file path=ppt/revisionInfo.xml><?xml version="1.0" encoding="utf-8"?>
-<p1510:revInfo xmlns:a="http://schemas.openxmlformats.org/drawingml/2006/main" xmlns:r="http://schemas.openxmlformats.org/officeDocument/2006/relationships" xmlns:p1510="http://schemas.microsoft.com/office/powerpoint/2015/10/main">
-  <p1510:revLst>
-    <p1510:client id="{C4FED9F4-1C3F-4FB5-98AB-9D7C96A49125}" v="2" dt="2024-08-20T09:08:00.328"/>
-  </p1510:revLst>
-</p1510:revInfo>
-</file>
-
 <file path=ppt/changesInfos/changesInfo1.xml><?xml version="1.0" encoding="utf-8"?>
 <pc:chgInfo xmlns:a="http://schemas.openxmlformats.org/drawingml/2006/main" xmlns:r="http://schemas.openxmlformats.org/officeDocument/2006/relationships" xmlns:ac="http://schemas.microsoft.com/office/drawing/2013/main/command" xmlns:pc="http://schemas.microsoft.com/office/powerpoint/2013/main/command">
+  <pc:docChgLst>
+    <pc:chgData name="Kenrie Vandekerckhove" userId="e6da4aef-2ddd-4c79-85e7-49815466d2d9" providerId="ADAL" clId="{E724B577-8723-4755-B134-B0AE8E57A9BF}"/>
+    <pc:docChg chg="modSld">
+      <pc:chgData name="Kenrie Vandekerckhove" userId="e6da4aef-2ddd-4c79-85e7-49815466d2d9" providerId="ADAL" clId="{E724B577-8723-4755-B134-B0AE8E57A9BF}" dt="2024-09-26T13:41:08.712" v="134" actId="20577"/>
+      <pc:docMkLst>
+        <pc:docMk/>
+      </pc:docMkLst>
+      <pc:sldChg chg="modSp mod">
+        <pc:chgData name="Kenrie Vandekerckhove" userId="e6da4aef-2ddd-4c79-85e7-49815466d2d9" providerId="ADAL" clId="{E724B577-8723-4755-B134-B0AE8E57A9BF}" dt="2024-09-26T13:41:08.712" v="134" actId="20577"/>
+        <pc:sldMkLst>
+          <pc:docMk/>
+          <pc:sldMk cId="605389948" sldId="259"/>
+        </pc:sldMkLst>
+        <pc:spChg chg="mod">
+          <ac:chgData name="Kenrie Vandekerckhove" userId="e6da4aef-2ddd-4c79-85e7-49815466d2d9" providerId="ADAL" clId="{E724B577-8723-4755-B134-B0AE8E57A9BF}" dt="2024-09-26T13:39:02.823" v="42" actId="20577"/>
+          <ac:spMkLst>
+            <pc:docMk/>
+            <pc:sldMk cId="605389948" sldId="259"/>
+            <ac:spMk id="3" creationId="{C9484A38-808E-49C3-AC6A-5F38EC734FFE}"/>
+          </ac:spMkLst>
+        </pc:spChg>
+        <pc:spChg chg="mod">
+          <ac:chgData name="Kenrie Vandekerckhove" userId="e6da4aef-2ddd-4c79-85e7-49815466d2d9" providerId="ADAL" clId="{E724B577-8723-4755-B134-B0AE8E57A9BF}" dt="2024-09-26T13:41:08.712" v="134" actId="20577"/>
+          <ac:spMkLst>
+            <pc:docMk/>
+            <pc:sldMk cId="605389948" sldId="259"/>
+            <ac:spMk id="38" creationId="{BF453FA0-7C61-6C1A-4866-179843F539E5}"/>
+          </ac:spMkLst>
+        </pc:spChg>
+      </pc:sldChg>
+    </pc:docChg>
+  </pc:docChgLst>
   <pc:docChgLst>
     <pc:chgData name="Ronny Mees" userId="S::u0082148@vives.be::4689c865-a4c6-4929-b963-b35e7a3f27b0" providerId="AD" clId="Web-{7DDE3AB7-290F-4C9B-B01D-F1A237B2FA97}"/>
     <pc:docChg chg="modSld">
@@ -450,7 +474,7 @@
           <a:p>
             <a:fld id="{CDF7AF62-86D8-402D-B735-90423DD750BA}" type="datetimeFigureOut">
               <a:rPr lang="nl-BE" smtClean="0"/>
-              <a:t>20/08/2024</a:t>
+              <a:t>26/09/2024</a:t>
             </a:fld>
             <a:endParaRPr lang="nl-BE"/>
           </a:p>
@@ -1290,8 +1314,16 @@
               </a:lnSpc>
             </a:pPr>
             <a:r>
+              <a:rPr lang="nl-BE" dirty="0" err="1"/>
+              <a:t>Greenhouse</a:t>
+            </a:r>
+            <a:r>
               <a:rPr lang="nl-BE" dirty="0"/>
-              <a:t>Project titel</a:t>
+              <a:t> </a:t>
+            </a:r>
+            <a:r>
+              <a:rPr lang="nl-BE" dirty="0" err="1"/>
+              <a:t>Sensoring</a:t>
             </a:r>
             <a:br>
               <a:rPr lang="nl-BE" dirty="0">
@@ -1316,7 +1348,7 @@
                   <a:srgbClr val="E00020"/>
                 </a:solidFill>
               </a:rPr>
-              <a:t>Subtitel</a:t>
+              <a:t>meten is weten </a:t>
             </a:r>
             <a:br>
               <a:rPr lang="nl-BE" sz="6000" dirty="0">
@@ -1537,8 +1569,8 @@
         </p:nvSpPr>
         <p:spPr>
           <a:xfrm>
-            <a:off x="16392626" y="38978795"/>
-            <a:ext cx="4766882" cy="2862322"/>
+            <a:off x="15154376" y="39207395"/>
+            <a:ext cx="9964716" cy="1938992"/>
           </a:xfrm>
           <a:prstGeom prst="rect">
             <a:avLst/>
@@ -1552,7 +1584,7 @@
           <a:lstStyle/>
           <a:p>
             <a:r>
-              <a:rPr lang="nl-BE" sz="3000" b="1">
+              <a:rPr lang="nl-BE" sz="3000" b="1" dirty="0">
                 <a:solidFill>
                   <a:srgbClr val="E00020"/>
                 </a:solidFill>
@@ -1566,9 +1598,22 @@
               <a:buChar char="•"/>
             </a:pPr>
             <a:r>
-              <a:rPr lang="nl-BE" sz="3000"/>
-              <a:t>Student 1, jaar en richting</a:t>
-            </a:r>
+              <a:rPr lang="nl-BE" sz="3000" dirty="0"/>
+              <a:t>Xander </a:t>
+            </a:r>
+            <a:r>
+              <a:rPr lang="nl-BE" sz="3000" dirty="0" err="1"/>
+              <a:t>Vyvey</a:t>
+            </a:r>
+            <a:r>
+              <a:rPr lang="nl-BE" sz="3000" dirty="0"/>
+              <a:t>, fase 3 Network &amp; System </a:t>
+            </a:r>
+            <a:r>
+              <a:rPr lang="nl-BE" sz="3000" dirty="0" err="1"/>
+              <a:t>Admin</a:t>
+            </a:r>
+            <a:endParaRPr lang="nl-BE" sz="3000" dirty="0"/>
           </a:p>
           <a:p>
             <a:pPr marL="457200" indent="-457200">
@@ -1576,9 +1621,22 @@
               <a:buChar char="•"/>
             </a:pPr>
             <a:r>
-              <a:rPr lang="nl-BE" sz="3000"/>
-              <a:t>Student 2 , jaar en richting</a:t>
-            </a:r>
+              <a:rPr lang="nl-BE" sz="3000" dirty="0"/>
+              <a:t>Ruben </a:t>
+            </a:r>
+            <a:r>
+              <a:rPr lang="nl-BE" sz="3000" dirty="0" err="1"/>
+              <a:t>Belligh</a:t>
+            </a:r>
+            <a:r>
+              <a:rPr lang="nl-BE" sz="3000" dirty="0"/>
+              <a:t>, fase 3 Network &amp; System </a:t>
+            </a:r>
+            <a:r>
+              <a:rPr lang="nl-BE" sz="3000" dirty="0" err="1"/>
+              <a:t>Admin</a:t>
+            </a:r>
+            <a:endParaRPr lang="nl-BE" sz="3000" dirty="0"/>
           </a:p>
           <a:p>
             <a:pPr marL="457200" indent="-457200">
@@ -1586,29 +1644,14 @@
               <a:buChar char="•"/>
             </a:pPr>
             <a:r>
-              <a:rPr lang="nl-BE" sz="3000"/>
-              <a:t>Student 3 , jaar en richting</a:t>
-            </a:r>
-          </a:p>
-          <a:p>
-            <a:pPr marL="457200" indent="-457200">
-              <a:buFont typeface="Arial" panose="020B0604020202020204" pitchFamily="34" charset="0"/>
-              <a:buChar char="•"/>
-            </a:pPr>
-            <a:r>
-              <a:rPr lang="nl-BE" sz="3000"/>
-              <a:t>Student 4 , jaar en richting</a:t>
-            </a:r>
-          </a:p>
-          <a:p>
-            <a:pPr marL="457200" indent="-457200">
-              <a:buFont typeface="Arial" panose="020B0604020202020204" pitchFamily="34" charset="0"/>
-              <a:buChar char="•"/>
-            </a:pPr>
-            <a:r>
-              <a:rPr lang="nl-BE" sz="3000"/>
-              <a:t>Student 5 , jaar en richting</a:t>
-            </a:r>
+              <a:rPr lang="nl-BE" sz="3000" dirty="0"/>
+              <a:t>Kenrie Vandekerckhove, fase 2 en Network &amp; System </a:t>
+            </a:r>
+            <a:r>
+              <a:rPr lang="nl-BE" sz="3000" dirty="0" err="1"/>
+              <a:t>Admin</a:t>
+            </a:r>
+            <a:endParaRPr lang="nl-BE" sz="3000" dirty="0"/>
           </a:p>
         </p:txBody>
       </p:sp>
@@ -2794,6 +2837,26 @@
 </file>
 
 <file path=customXml/item1.xml><?xml version="1.0" encoding="utf-8"?>
+<p:properties xmlns:p="http://schemas.microsoft.com/office/2006/metadata/properties" xmlns:xsi="http://www.w3.org/2001/XMLSchema-instance" xmlns:pc="http://schemas.microsoft.com/office/infopath/2007/PartnerControls">
+  <documentManagement>
+    <TaxCatchAll xmlns="f921bb7d-4033-42bd-968a-881fd459c073" xsi:nil="true"/>
+    <lcf76f155ced4ddcb4097134ff3c332f xmlns="7af3f08f-6b65-4c98-b033-853692dc00be">
+      <Terms xmlns="http://schemas.microsoft.com/office/infopath/2007/PartnerControls"/>
+    </lcf76f155ced4ddcb4097134ff3c332f>
+  </documentManagement>
+</p:properties>
+</file>
+
+<file path=customXml/item2.xml><?xml version="1.0" encoding="utf-8"?>
+<?mso-contentType ?>
+<FormTemplates xmlns="http://schemas.microsoft.com/sharepoint/v3/contenttype/forms">
+  <Display>DocumentLibraryForm</Display>
+  <Edit>DocumentLibraryForm</Edit>
+  <New>DocumentLibraryForm</New>
+</FormTemplates>
+</file>
+
+<file path=customXml/item3.xml><?xml version="1.0" encoding="utf-8"?>
 <ct:contentTypeSchema xmlns:ct="http://schemas.microsoft.com/office/2006/metadata/contentType" xmlns:ma="http://schemas.microsoft.com/office/2006/metadata/properties/metaAttributes" ct:_="" ma:_="" ma:contentTypeName="Document" ma:contentTypeID="0x0101001EA315BEEDAF0940BE0419D11160810D" ma:contentTypeVersion="13" ma:contentTypeDescription="Een nieuw document maken." ma:contentTypeScope="" ma:versionID="65cc36ba5ecf2b8ae38cfb5d3600ecb6">
   <xsd:schema xmlns:xsd="http://www.w3.org/2001/XMLSchema" xmlns:xs="http://www.w3.org/2001/XMLSchema" xmlns:p="http://schemas.microsoft.com/office/2006/metadata/properties" xmlns:ns2="7af3f08f-6b65-4c98-b033-853692dc00be" xmlns:ns3="f921bb7d-4033-42bd-968a-881fd459c073" targetNamespace="http://schemas.microsoft.com/office/2006/metadata/properties" ma:root="true" ma:fieldsID="4337c3901829783fe22243fefdc46442" ns2:_="" ns3:_="">
     <xsd:import namespace="7af3f08f-6b65-4c98-b033-853692dc00be"/>
@@ -3000,27 +3063,32 @@
 </ct:contentTypeSchema>
 </file>
 
-<file path=customXml/item2.xml><?xml version="1.0" encoding="utf-8"?>
-<?mso-contentType ?>
-<FormTemplates xmlns="http://schemas.microsoft.com/sharepoint/v3/contenttype/forms">
-  <Display>DocumentLibraryForm</Display>
-  <Edit>DocumentLibraryForm</Edit>
-  <New>DocumentLibraryForm</New>
-</FormTemplates>
+<file path=customXml/itemProps1.xml><?xml version="1.0" encoding="utf-8"?>
+<ds:datastoreItem xmlns:ds="http://schemas.openxmlformats.org/officeDocument/2006/customXml" ds:itemID="{B247EB90-66CA-4409-98FF-5024AA619E64}">
+  <ds:schemaRefs>
+    <ds:schemaRef ds:uri="7af3f08f-6b65-4c98-b033-853692dc00be"/>
+    <ds:schemaRef ds:uri="f921bb7d-4033-42bd-968a-881fd459c073"/>
+    <ds:schemaRef ds:uri="http://purl.org/dc/dcmitype/"/>
+    <ds:schemaRef ds:uri="http://purl.org/dc/elements/1.1/"/>
+    <ds:schemaRef ds:uri="http://purl.org/dc/terms/"/>
+    <ds:schemaRef ds:uri="http://schemas.microsoft.com/office/2006/documentManagement/types"/>
+    <ds:schemaRef ds:uri="http://schemas.microsoft.com/office/2006/metadata/properties"/>
+    <ds:schemaRef ds:uri="http://schemas.microsoft.com/office/infopath/2007/PartnerControls"/>
+    <ds:schemaRef ds:uri="http://schemas.openxmlformats.org/package/2006/metadata/core-properties"/>
+    <ds:schemaRef ds:uri="http://www.w3.org/XML/1998/namespace"/>
+  </ds:schemaRefs>
+</ds:datastoreItem>
 </file>
 
-<file path=customXml/item3.xml><?xml version="1.0" encoding="utf-8"?>
-<p:properties xmlns:p="http://schemas.microsoft.com/office/2006/metadata/properties" xmlns:xsi="http://www.w3.org/2001/XMLSchema-instance" xmlns:pc="http://schemas.microsoft.com/office/infopath/2007/PartnerControls">
-  <documentManagement>
-    <TaxCatchAll xmlns="f921bb7d-4033-42bd-968a-881fd459c073" xsi:nil="true"/>
-    <lcf76f155ced4ddcb4097134ff3c332f xmlns="7af3f08f-6b65-4c98-b033-853692dc00be">
-      <Terms xmlns="http://schemas.microsoft.com/office/infopath/2007/PartnerControls"/>
-    </lcf76f155ced4ddcb4097134ff3c332f>
-  </documentManagement>
-</p:properties>
+<file path=customXml/itemProps2.xml><?xml version="1.0" encoding="utf-8"?>
+<ds:datastoreItem xmlns:ds="http://schemas.openxmlformats.org/officeDocument/2006/customXml" ds:itemID="{E1FA04DA-A2C1-4A00-9FA4-1F6991DECE56}">
+  <ds:schemaRefs>
+    <ds:schemaRef ds:uri="http://schemas.microsoft.com/sharepoint/v3/contenttype/forms"/>
+  </ds:schemaRefs>
+</ds:datastoreItem>
 </file>
 
-<file path=customXml/itemProps1.xml><?xml version="1.0" encoding="utf-8"?>
+<file path=customXml/itemProps3.xml><?xml version="1.0" encoding="utf-8"?>
 <ds:datastoreItem xmlns:ds="http://schemas.openxmlformats.org/officeDocument/2006/customXml" ds:itemID="{B09BCEE1-615B-41DE-9A08-D2B491EEAFBE}">
   <ds:schemaRefs>
     <ds:schemaRef ds:uri="7af3f08f-6b65-4c98-b033-853692dc00be"/>
@@ -3037,29 +3105,4 @@
     <ds:schemaRef ds:uri="http://www.w3.org/2001/XMLSchema"/>
   </ds:schemaRefs>
 </ds:datastoreItem>
-</file>
-
-<file path=customXml/itemProps2.xml><?xml version="1.0" encoding="utf-8"?>
-<ds:datastoreItem xmlns:ds="http://schemas.openxmlformats.org/officeDocument/2006/customXml" ds:itemID="{E1FA04DA-A2C1-4A00-9FA4-1F6991DECE56}">
-  <ds:schemaRefs>
-    <ds:schemaRef ds:uri="http://schemas.microsoft.com/sharepoint/v3/contenttype/forms"/>
-  </ds:schemaRefs>
-</ds:datastoreItem>
-</file>
-
-<file path=customXml/itemProps3.xml><?xml version="1.0" encoding="utf-8"?>
-<ds:datastoreItem xmlns:ds="http://schemas.openxmlformats.org/officeDocument/2006/customXml" ds:itemID="{B247EB90-66CA-4409-98FF-5024AA619E64}">
-  <ds:schemaRefs>
-    <ds:schemaRef ds:uri="7af3f08f-6b65-4c98-b033-853692dc00be"/>
-    <ds:schemaRef ds:uri="f921bb7d-4033-42bd-968a-881fd459c073"/>
-    <ds:schemaRef ds:uri="http://purl.org/dc/dcmitype/"/>
-    <ds:schemaRef ds:uri="http://purl.org/dc/elements/1.1/"/>
-    <ds:schemaRef ds:uri="http://purl.org/dc/terms/"/>
-    <ds:schemaRef ds:uri="http://schemas.microsoft.com/office/2006/documentManagement/types"/>
-    <ds:schemaRef ds:uri="http://schemas.microsoft.com/office/2006/metadata/properties"/>
-    <ds:schemaRef ds:uri="http://schemas.microsoft.com/office/infopath/2007/PartnerControls"/>
-    <ds:schemaRef ds:uri="http://schemas.openxmlformats.org/package/2006/metadata/core-properties"/>
-    <ds:schemaRef ds:uri="http://www.w3.org/XML/1998/namespace"/>
-  </ds:schemaRefs>
-</ds:datastoreItem>
 </file>
</xml_diff>